<commit_message>
Adicionando página de Maquinas
</commit_message>
<xml_diff>
--- a/Prototipação de Dashboard/Prototipação-de-Tela.pptx
+++ b/Prototipação de Dashboard/Prototipação-de-Tela.pptx
@@ -137,6 +137,35 @@
 </p:cmAuthorLst>
 </file>
 
+<file path=ppt/changesInfos/changesInfo1.xml><?xml version="1.0" encoding="utf-8"?>
+<pc:chgInfo xmlns:a="http://schemas.openxmlformats.org/drawingml/2006/main" xmlns:r="http://schemas.openxmlformats.org/officeDocument/2006/relationships" xmlns:ac="http://schemas.microsoft.com/office/drawing/2013/main/command" xmlns:pc="http://schemas.microsoft.com/office/powerpoint/2013/main/command">
+  <pc:docChgLst>
+    <pc:chgData name="cesar" userId="10cb0cc1dc347670" providerId="LiveId" clId="{AEB8DCF8-509F-4EE5-890C-93D18F688FF4}"/>
+    <pc:docChg chg="modSld">
+      <pc:chgData name="cesar" userId="10cb0cc1dc347670" providerId="LiveId" clId="{AEB8DCF8-509F-4EE5-890C-93D18F688FF4}" dt="2020-10-26T01:46:41.306" v="0" actId="1076"/>
+      <pc:docMkLst>
+        <pc:docMk/>
+      </pc:docMkLst>
+      <pc:sldChg chg="modSp mod">
+        <pc:chgData name="cesar" userId="10cb0cc1dc347670" providerId="LiveId" clId="{AEB8DCF8-509F-4EE5-890C-93D18F688FF4}" dt="2020-10-26T01:46:41.306" v="0" actId="1076"/>
+        <pc:sldMkLst>
+          <pc:docMk/>
+          <pc:sldMk cId="2031529763" sldId="260"/>
+        </pc:sldMkLst>
+        <pc:spChg chg="mod">
+          <ac:chgData name="cesar" userId="10cb0cc1dc347670" providerId="LiveId" clId="{AEB8DCF8-509F-4EE5-890C-93D18F688FF4}" dt="2020-10-26T01:46:41.306" v="0" actId="1076"/>
+          <ac:spMkLst>
+            <pc:docMk/>
+            <pc:sldMk cId="2031529763" sldId="260"/>
+            <ac:spMk id="39" creationId="{82A140F7-D5E6-4D5A-80C6-E0A9A1F7AC2F}"/>
+          </ac:spMkLst>
+        </pc:spChg>
+      </pc:sldChg>
+    </pc:docChg>
+  </pc:docChgLst>
+</pc:chgInfo>
+</file>
+
 <file path=ppt/slideLayouts/slideLayout1.xml><?xml version="1.0" encoding="utf-8"?>
 <p:sldLayout xmlns:a="http://schemas.openxmlformats.org/drawingml/2006/main" xmlns:r="http://schemas.openxmlformats.org/officeDocument/2006/relationships" xmlns:p="http://schemas.openxmlformats.org/presentationml/2006/main" type="title" preserve="1">
   <p:cSld name="Slide de Título">
@@ -284,7 +313,7 @@
           <a:p>
             <a:fld id="{E20D7C4E-81C6-43FC-8D33-9E856BB74CE5}" type="datetimeFigureOut">
               <a:rPr lang="pt-BR" smtClean="0"/>
-              <a:t>24/10/2020</a:t>
+              <a:t>25/10/2020</a:t>
             </a:fld>
             <a:endParaRPr lang="pt-BR"/>
           </a:p>
@@ -482,7 +511,7 @@
           <a:p>
             <a:fld id="{E20D7C4E-81C6-43FC-8D33-9E856BB74CE5}" type="datetimeFigureOut">
               <a:rPr lang="pt-BR" smtClean="0"/>
-              <a:t>24/10/2020</a:t>
+              <a:t>25/10/2020</a:t>
             </a:fld>
             <a:endParaRPr lang="pt-BR"/>
           </a:p>
@@ -690,7 +719,7 @@
           <a:p>
             <a:fld id="{E20D7C4E-81C6-43FC-8D33-9E856BB74CE5}" type="datetimeFigureOut">
               <a:rPr lang="pt-BR" smtClean="0"/>
-              <a:t>24/10/2020</a:t>
+              <a:t>25/10/2020</a:t>
             </a:fld>
             <a:endParaRPr lang="pt-BR"/>
           </a:p>
@@ -888,7 +917,7 @@
           <a:p>
             <a:fld id="{E20D7C4E-81C6-43FC-8D33-9E856BB74CE5}" type="datetimeFigureOut">
               <a:rPr lang="pt-BR" smtClean="0"/>
-              <a:t>24/10/2020</a:t>
+              <a:t>25/10/2020</a:t>
             </a:fld>
             <a:endParaRPr lang="pt-BR"/>
           </a:p>
@@ -1163,7 +1192,7 @@
           <a:p>
             <a:fld id="{E20D7C4E-81C6-43FC-8D33-9E856BB74CE5}" type="datetimeFigureOut">
               <a:rPr lang="pt-BR" smtClean="0"/>
-              <a:t>24/10/2020</a:t>
+              <a:t>25/10/2020</a:t>
             </a:fld>
             <a:endParaRPr lang="pt-BR"/>
           </a:p>
@@ -1428,7 +1457,7 @@
           <a:p>
             <a:fld id="{E20D7C4E-81C6-43FC-8D33-9E856BB74CE5}" type="datetimeFigureOut">
               <a:rPr lang="pt-BR" smtClean="0"/>
-              <a:t>24/10/2020</a:t>
+              <a:t>25/10/2020</a:t>
             </a:fld>
             <a:endParaRPr lang="pt-BR"/>
           </a:p>
@@ -1840,7 +1869,7 @@
           <a:p>
             <a:fld id="{E20D7C4E-81C6-43FC-8D33-9E856BB74CE5}" type="datetimeFigureOut">
               <a:rPr lang="pt-BR" smtClean="0"/>
-              <a:t>24/10/2020</a:t>
+              <a:t>25/10/2020</a:t>
             </a:fld>
             <a:endParaRPr lang="pt-BR"/>
           </a:p>
@@ -1981,7 +2010,7 @@
           <a:p>
             <a:fld id="{E20D7C4E-81C6-43FC-8D33-9E856BB74CE5}" type="datetimeFigureOut">
               <a:rPr lang="pt-BR" smtClean="0"/>
-              <a:t>24/10/2020</a:t>
+              <a:t>25/10/2020</a:t>
             </a:fld>
             <a:endParaRPr lang="pt-BR"/>
           </a:p>
@@ -2094,7 +2123,7 @@
           <a:p>
             <a:fld id="{E20D7C4E-81C6-43FC-8D33-9E856BB74CE5}" type="datetimeFigureOut">
               <a:rPr lang="pt-BR" smtClean="0"/>
-              <a:t>24/10/2020</a:t>
+              <a:t>25/10/2020</a:t>
             </a:fld>
             <a:endParaRPr lang="pt-BR"/>
           </a:p>
@@ -2405,7 +2434,7 @@
           <a:p>
             <a:fld id="{E20D7C4E-81C6-43FC-8D33-9E856BB74CE5}" type="datetimeFigureOut">
               <a:rPr lang="pt-BR" smtClean="0"/>
-              <a:t>24/10/2020</a:t>
+              <a:t>25/10/2020</a:t>
             </a:fld>
             <a:endParaRPr lang="pt-BR"/>
           </a:p>
@@ -2693,7 +2722,7 @@
           <a:p>
             <a:fld id="{E20D7C4E-81C6-43FC-8D33-9E856BB74CE5}" type="datetimeFigureOut">
               <a:rPr lang="pt-BR" smtClean="0"/>
-              <a:t>24/10/2020</a:t>
+              <a:t>25/10/2020</a:t>
             </a:fld>
             <a:endParaRPr lang="pt-BR"/>
           </a:p>
@@ -2934,7 +2963,7 @@
           <a:p>
             <a:fld id="{E20D7C4E-81C6-43FC-8D33-9E856BB74CE5}" type="datetimeFigureOut">
               <a:rPr lang="pt-BR" smtClean="0"/>
-              <a:t>24/10/2020</a:t>
+              <a:t>25/10/2020</a:t>
             </a:fld>
             <a:endParaRPr lang="pt-BR"/>
           </a:p>
@@ -12754,7 +12783,7 @@
         </p:nvSpPr>
         <p:spPr>
           <a:xfrm>
-            <a:off x="-3741" y="0"/>
+            <a:off x="-78219" y="119252"/>
             <a:ext cx="12195741" cy="6858000"/>
           </a:xfrm>
           <a:prstGeom prst="rect">

</xml_diff>